<commit_message>
Working release. Base line
</commit_message>
<xml_diff>
--- a/Презентация/Тепловая карта предложений жилья.pptx
+++ b/Презентация/Тепловая карта предложений жилья.pptx
@@ -7,9 +7,20 @@
   <p:sldIdLst>
     <p:sldId id="256" r:id="rId2"/>
     <p:sldId id="257" r:id="rId3"/>
-    <p:sldId id="258" r:id="rId4"/>
-    <p:sldId id="259" r:id="rId5"/>
-    <p:sldId id="260" r:id="rId6"/>
+    <p:sldId id="259" r:id="rId4"/>
+    <p:sldId id="260" r:id="rId5"/>
+    <p:sldId id="261" r:id="rId6"/>
+    <p:sldId id="271" r:id="rId7"/>
+    <p:sldId id="262" r:id="rId8"/>
+    <p:sldId id="263" r:id="rId9"/>
+    <p:sldId id="264" r:id="rId10"/>
+    <p:sldId id="265" r:id="rId11"/>
+    <p:sldId id="266" r:id="rId12"/>
+    <p:sldId id="267" r:id="rId13"/>
+    <p:sldId id="268" r:id="rId14"/>
+    <p:sldId id="269" r:id="rId15"/>
+    <p:sldId id="270" r:id="rId16"/>
+    <p:sldId id="272" r:id="rId17"/>
   </p:sldIdLst>
   <p:sldSz cx="12192000" cy="6858000"/>
   <p:notesSz cx="6858000" cy="9144000"/>
@@ -108,6 +119,11 @@
       </a:defRPr>
     </a:lvl9pPr>
   </p:defaultTextStyle>
+  <p:extLst>
+    <p:ext uri="{EFAFB233-063F-42B5-8137-9DF3F51BA10A}">
+      <p15:sldGuideLst xmlns:p15="http://schemas.microsoft.com/office/powerpoint/2012/main"/>
+    </p:ext>
+  </p:extLst>
 </p:presentation>
 </file>
 
@@ -337,7 +353,7 @@
           <a:p>
             <a:fld id="{875D5A14-F4D0-4E51-86C0-F58E69798340}" type="datetimeFigureOut">
               <a:rPr lang="ru-RU" smtClean="0"/>
-              <a:t>07.12.2017</a:t>
+              <a:t>17.01.2018</a:t>
             </a:fld>
             <a:endParaRPr lang="ru-RU"/>
           </a:p>
@@ -545,7 +561,7 @@
           <a:p>
             <a:fld id="{875D5A14-F4D0-4E51-86C0-F58E69798340}" type="datetimeFigureOut">
               <a:rPr lang="ru-RU" smtClean="0"/>
-              <a:t>07.12.2017</a:t>
+              <a:t>17.01.2018</a:t>
             </a:fld>
             <a:endParaRPr lang="ru-RU"/>
           </a:p>
@@ -801,7 +817,7 @@
           <a:p>
             <a:fld id="{875D5A14-F4D0-4E51-86C0-F58E69798340}" type="datetimeFigureOut">
               <a:rPr lang="ru-RU" smtClean="0"/>
-              <a:t>07.12.2017</a:t>
+              <a:t>17.01.2018</a:t>
             </a:fld>
             <a:endParaRPr lang="ru-RU"/>
           </a:p>
@@ -975,7 +991,7 @@
           <a:p>
             <a:fld id="{875D5A14-F4D0-4E51-86C0-F58E69798340}" type="datetimeFigureOut">
               <a:rPr lang="ru-RU" smtClean="0"/>
-              <a:t>07.12.2017</a:t>
+              <a:t>17.01.2018</a:t>
             </a:fld>
             <a:endParaRPr lang="ru-RU"/>
           </a:p>
@@ -1318,7 +1334,7 @@
           <a:p>
             <a:fld id="{875D5A14-F4D0-4E51-86C0-F58E69798340}" type="datetimeFigureOut">
               <a:rPr lang="ru-RU" smtClean="0"/>
-              <a:t>07.12.2017</a:t>
+              <a:t>17.01.2018</a:t>
             </a:fld>
             <a:endParaRPr lang="ru-RU"/>
           </a:p>
@@ -1593,7 +1609,7 @@
           <a:p>
             <a:fld id="{875D5A14-F4D0-4E51-86C0-F58E69798340}" type="datetimeFigureOut">
               <a:rPr lang="ru-RU" smtClean="0"/>
-              <a:t>07.12.2017</a:t>
+              <a:t>17.01.2018</a:t>
             </a:fld>
             <a:endParaRPr lang="ru-RU"/>
           </a:p>
@@ -1972,7 +1988,7 @@
           <a:p>
             <a:fld id="{875D5A14-F4D0-4E51-86C0-F58E69798340}" type="datetimeFigureOut">
               <a:rPr lang="ru-RU" smtClean="0"/>
-              <a:t>07.12.2017</a:t>
+              <a:t>17.01.2018</a:t>
             </a:fld>
             <a:endParaRPr lang="ru-RU"/>
           </a:p>
@@ -2090,7 +2106,7 @@
           <a:p>
             <a:fld id="{875D5A14-F4D0-4E51-86C0-F58E69798340}" type="datetimeFigureOut">
               <a:rPr lang="ru-RU" smtClean="0"/>
-              <a:t>07.12.2017</a:t>
+              <a:t>17.01.2018</a:t>
             </a:fld>
             <a:endParaRPr lang="ru-RU"/>
           </a:p>
@@ -2261,7 +2277,7 @@
           <a:p>
             <a:fld id="{875D5A14-F4D0-4E51-86C0-F58E69798340}" type="datetimeFigureOut">
               <a:rPr lang="ru-RU" smtClean="0"/>
-              <a:t>07.12.2017</a:t>
+              <a:t>17.01.2018</a:t>
             </a:fld>
             <a:endParaRPr lang="ru-RU"/>
           </a:p>
@@ -2615,7 +2631,7 @@
           <a:p>
             <a:fld id="{875D5A14-F4D0-4E51-86C0-F58E69798340}" type="datetimeFigureOut">
               <a:rPr lang="ru-RU" smtClean="0"/>
-              <a:t>07.12.2017</a:t>
+              <a:t>17.01.2018</a:t>
             </a:fld>
             <a:endParaRPr lang="ru-RU"/>
           </a:p>
@@ -2997,7 +3013,7 @@
           <a:p>
             <a:fld id="{875D5A14-F4D0-4E51-86C0-F58E69798340}" type="datetimeFigureOut">
               <a:rPr lang="ru-RU" smtClean="0"/>
-              <a:t>07.12.2017</a:t>
+              <a:t>17.01.2018</a:t>
             </a:fld>
             <a:endParaRPr lang="ru-RU"/>
           </a:p>
@@ -3284,7 +3300,7 @@
           <a:p>
             <a:fld id="{875D5A14-F4D0-4E51-86C0-F58E69798340}" type="datetimeFigureOut">
               <a:rPr lang="ru-RU" smtClean="0"/>
-              <a:t>07.12.2017</a:t>
+              <a:t>17.01.2018</a:t>
             </a:fld>
             <a:endParaRPr lang="ru-RU"/>
           </a:p>
@@ -3899,6 +3915,980 @@
 </p:sld>
 </file>
 
+<file path=ppt/slides/slide10.xml><?xml version="1.0" encoding="utf-8"?>
+<p:sld xmlns:a="http://schemas.openxmlformats.org/drawingml/2006/main" xmlns:r="http://schemas.openxmlformats.org/officeDocument/2006/relationships" xmlns:p="http://schemas.openxmlformats.org/presentationml/2006/main">
+  <p:cSld>
+    <p:spTree>
+      <p:nvGrpSpPr>
+        <p:cNvPr id="1" name=""/>
+        <p:cNvGrpSpPr/>
+        <p:nvPr/>
+      </p:nvGrpSpPr>
+      <p:grpSpPr>
+        <a:xfrm>
+          <a:off x="0" y="0"/>
+          <a:ext cx="0" cy="0"/>
+          <a:chOff x="0" y="0"/>
+          <a:chExt cx="0" cy="0"/>
+        </a:xfrm>
+      </p:grpSpPr>
+      <p:sp>
+        <p:nvSpPr>
+          <p:cNvPr id="2" name="Заголовок 1"/>
+          <p:cNvSpPr>
+            <a:spLocks noGrp="1"/>
+          </p:cNvSpPr>
+          <p:nvPr>
+            <p:ph type="title"/>
+          </p:nvPr>
+        </p:nvSpPr>
+        <p:spPr/>
+        <p:txBody>
+          <a:bodyPr/>
+          <a:lstStyle/>
+          <a:p>
+            <a:pPr algn="ctr"/>
+            <a:r>
+              <a:rPr lang="ru-RU" dirty="0" smtClean="0"/>
+              <a:t>Структура сервера</a:t>
+            </a:r>
+            <a:endParaRPr lang="ru-RU" dirty="0"/>
+          </a:p>
+        </p:txBody>
+      </p:sp>
+      <p:sp>
+        <p:nvSpPr>
+          <p:cNvPr id="3" name="Объект 2"/>
+          <p:cNvSpPr>
+            <a:spLocks noGrp="1"/>
+          </p:cNvSpPr>
+          <p:nvPr>
+            <p:ph idx="1"/>
+          </p:nvPr>
+        </p:nvSpPr>
+        <p:spPr>
+          <a:xfrm>
+            <a:off x="1097281" y="1845734"/>
+            <a:ext cx="5278582" cy="4023360"/>
+          </a:xfrm>
+        </p:spPr>
+        <p:txBody>
+          <a:bodyPr/>
+          <a:lstStyle/>
+          <a:p>
+            <a:pPr lvl="1">
+              <a:buFont typeface="Arial" panose="020B0604020202020204" pitchFamily="34" charset="0"/>
+              <a:buChar char="•"/>
+            </a:pPr>
+            <a:r>
+              <a:rPr lang="ru-RU" dirty="0" smtClean="0"/>
+              <a:t>Пакет </a:t>
+            </a:r>
+            <a:r>
+              <a:rPr lang="en-US" dirty="0" smtClean="0"/>
+              <a:t>map c</a:t>
+            </a:r>
+            <a:r>
+              <a:rPr lang="ru-RU" dirty="0" smtClean="0"/>
+              <a:t>одержит все классы связаные с картой</a:t>
+            </a:r>
+            <a:endParaRPr lang="en-US" dirty="0" smtClean="0"/>
+          </a:p>
+          <a:p>
+            <a:pPr lvl="1">
+              <a:buFont typeface="Arial" panose="020B0604020202020204" pitchFamily="34" charset="0"/>
+              <a:buChar char="•"/>
+            </a:pPr>
+            <a:endParaRPr lang="ru-RU" dirty="0" smtClean="0"/>
+          </a:p>
+          <a:p>
+            <a:pPr lvl="1">
+              <a:buFont typeface="Arial" panose="020B0604020202020204" pitchFamily="34" charset="0"/>
+              <a:buChar char="•"/>
+            </a:pPr>
+            <a:r>
+              <a:rPr lang="ru-RU" dirty="0" smtClean="0"/>
+              <a:t>Пакет </a:t>
+            </a:r>
+            <a:r>
+              <a:rPr lang="en-US" dirty="0" smtClean="0"/>
+              <a:t>handlers</a:t>
+            </a:r>
+            <a:r>
+              <a:rPr lang="ru-RU" dirty="0" smtClean="0"/>
+              <a:t> содержит все классы отвечающие за обработку запросов</a:t>
+            </a:r>
+            <a:endParaRPr lang="en-US" dirty="0" smtClean="0"/>
+          </a:p>
+          <a:p>
+            <a:pPr lvl="1">
+              <a:buFont typeface="Arial" panose="020B0604020202020204" pitchFamily="34" charset="0"/>
+              <a:buChar char="•"/>
+            </a:pPr>
+            <a:endParaRPr lang="ru-RU" dirty="0" smtClean="0"/>
+          </a:p>
+          <a:p>
+            <a:pPr lvl="1">
+              <a:buFont typeface="Arial" panose="020B0604020202020204" pitchFamily="34" charset="0"/>
+              <a:buChar char="•"/>
+            </a:pPr>
+            <a:r>
+              <a:rPr lang="ru-RU" dirty="0" smtClean="0"/>
+              <a:t>Пакет </a:t>
+            </a:r>
+            <a:r>
+              <a:rPr lang="en-US" dirty="0" smtClean="0"/>
+              <a:t>utils</a:t>
+            </a:r>
+            <a:r>
+              <a:rPr lang="ru-RU" dirty="0" smtClean="0"/>
+              <a:t> содержит вспомогательные классы</a:t>
+            </a:r>
+            <a:endParaRPr lang="ru-RU" dirty="0"/>
+          </a:p>
+        </p:txBody>
+      </p:sp>
+      <p:pic>
+        <p:nvPicPr>
+          <p:cNvPr id="4" name="Рисунок 3"/>
+          <p:cNvPicPr>
+            <a:picLocks noChangeAspect="1"/>
+          </p:cNvPicPr>
+          <p:nvPr/>
+        </p:nvPicPr>
+        <p:blipFill rotWithShape="1">
+          <a:blip r:embed="rId2">
+            <a:extLst>
+              <a:ext uri="{28A0092B-C50C-407E-A947-70E740481C1C}">
+                <a14:useLocalDpi xmlns:a14="http://schemas.microsoft.com/office/drawing/2010/main" val="0"/>
+              </a:ext>
+            </a:extLst>
+          </a:blip>
+          <a:srcRect l="13410"/>
+          <a:stretch/>
+        </p:blipFill>
+        <p:spPr>
+          <a:xfrm>
+            <a:off x="9277004" y="872837"/>
+            <a:ext cx="1878676" cy="5469774"/>
+          </a:xfrm>
+          <a:prstGeom prst="rect">
+            <a:avLst/>
+          </a:prstGeom>
+        </p:spPr>
+      </p:pic>
+    </p:spTree>
+    <p:extLst>
+      <p:ext uri="{BB962C8B-B14F-4D97-AF65-F5344CB8AC3E}">
+        <p14:creationId xmlns:p14="http://schemas.microsoft.com/office/powerpoint/2010/main" val="570510759"/>
+      </p:ext>
+    </p:extLst>
+  </p:cSld>
+  <p:clrMapOvr>
+    <a:masterClrMapping/>
+  </p:clrMapOvr>
+</p:sld>
+</file>
+
+<file path=ppt/slides/slide11.xml><?xml version="1.0" encoding="utf-8"?>
+<p:sld xmlns:a="http://schemas.openxmlformats.org/drawingml/2006/main" xmlns:r="http://schemas.openxmlformats.org/officeDocument/2006/relationships" xmlns:p="http://schemas.openxmlformats.org/presentationml/2006/main">
+  <p:cSld>
+    <p:spTree>
+      <p:nvGrpSpPr>
+        <p:cNvPr id="1" name=""/>
+        <p:cNvGrpSpPr/>
+        <p:nvPr/>
+      </p:nvGrpSpPr>
+      <p:grpSpPr>
+        <a:xfrm>
+          <a:off x="0" y="0"/>
+          <a:ext cx="0" cy="0"/>
+          <a:chOff x="0" y="0"/>
+          <a:chExt cx="0" cy="0"/>
+        </a:xfrm>
+      </p:grpSpPr>
+      <p:sp>
+        <p:nvSpPr>
+          <p:cNvPr id="2" name="Заголовок 1"/>
+          <p:cNvSpPr>
+            <a:spLocks noGrp="1"/>
+          </p:cNvSpPr>
+          <p:nvPr>
+            <p:ph type="title"/>
+          </p:nvPr>
+        </p:nvSpPr>
+        <p:spPr/>
+        <p:txBody>
+          <a:bodyPr/>
+          <a:lstStyle/>
+          <a:p>
+            <a:pPr algn="ctr"/>
+            <a:r>
+              <a:rPr lang="ru-RU" dirty="0"/>
+              <a:t>Структура сервера</a:t>
+            </a:r>
+          </a:p>
+        </p:txBody>
+      </p:sp>
+      <p:sp>
+        <p:nvSpPr>
+          <p:cNvPr id="3" name="Объект 2"/>
+          <p:cNvSpPr>
+            <a:spLocks noGrp="1"/>
+          </p:cNvSpPr>
+          <p:nvPr>
+            <p:ph idx="1"/>
+          </p:nvPr>
+        </p:nvSpPr>
+        <p:spPr/>
+        <p:txBody>
+          <a:bodyPr/>
+          <a:lstStyle/>
+          <a:p>
+            <a:pPr lvl="1">
+              <a:buFont typeface="Arial" panose="020B0604020202020204" pitchFamily="34" charset="0"/>
+              <a:buChar char="•"/>
+            </a:pPr>
+            <a:r>
+              <a:rPr lang="ru-RU" dirty="0" smtClean="0"/>
+              <a:t>Класс</a:t>
+            </a:r>
+            <a:r>
+              <a:rPr lang="en-US" dirty="0" smtClean="0"/>
+              <a:t> PropertyMap </a:t>
+            </a:r>
+            <a:r>
+              <a:rPr lang="ru-RU" dirty="0" smtClean="0"/>
+              <a:t>является основным, он хранит все данные о карте, и прдоставляет доступ ко всем методам для работы как с картой, так и с дорожным графом</a:t>
+            </a:r>
+            <a:endParaRPr lang="en-US" dirty="0" smtClean="0"/>
+          </a:p>
+          <a:p>
+            <a:pPr lvl="1">
+              <a:buFont typeface="Arial" panose="020B0604020202020204" pitchFamily="34" charset="0"/>
+              <a:buChar char="•"/>
+            </a:pPr>
+            <a:endParaRPr lang="ru-RU" dirty="0" smtClean="0"/>
+          </a:p>
+          <a:p>
+            <a:pPr lvl="1">
+              <a:buFont typeface="Arial" panose="020B0604020202020204" pitchFamily="34" charset="0"/>
+              <a:buChar char="•"/>
+            </a:pPr>
+            <a:r>
+              <a:rPr lang="ru-RU" dirty="0" smtClean="0"/>
+              <a:t>Класс </a:t>
+            </a:r>
+            <a:r>
+              <a:rPr lang="en-US" dirty="0" smtClean="0"/>
+              <a:t>QuadTree</a:t>
+            </a:r>
+            <a:r>
+              <a:rPr lang="ru-RU" dirty="0" smtClean="0"/>
+              <a:t> является реализацией квадродерева</a:t>
+            </a:r>
+            <a:r>
+              <a:rPr lang="en-US" dirty="0" smtClean="0"/>
+              <a:t> </a:t>
+            </a:r>
+            <a:r>
+              <a:rPr lang="ru-RU" dirty="0" smtClean="0"/>
+              <a:t>и содержит в себе реализацию всех методов для работы с деревом</a:t>
+            </a:r>
+            <a:endParaRPr lang="en-US" dirty="0" smtClean="0"/>
+          </a:p>
+          <a:p>
+            <a:pPr lvl="1">
+              <a:buFont typeface="Arial" panose="020B0604020202020204" pitchFamily="34" charset="0"/>
+              <a:buChar char="•"/>
+            </a:pPr>
+            <a:endParaRPr lang="en-US" dirty="0"/>
+          </a:p>
+          <a:p>
+            <a:pPr lvl="1">
+              <a:buFont typeface="Arial" panose="020B0604020202020204" pitchFamily="34" charset="0"/>
+              <a:buChar char="•"/>
+            </a:pPr>
+            <a:r>
+              <a:rPr lang="ru-RU" dirty="0" smtClean="0"/>
+              <a:t>Классы из пакета </a:t>
+            </a:r>
+            <a:r>
+              <a:rPr lang="en-US" dirty="0" smtClean="0"/>
+              <a:t>utils</a:t>
+            </a:r>
+            <a:r>
+              <a:rPr lang="ru-RU" dirty="0" smtClean="0"/>
+              <a:t> реализуют кэш рассчитаных графов, подсказки при поиске</a:t>
+            </a:r>
+            <a:r>
+              <a:rPr lang="en-US" dirty="0" smtClean="0"/>
+              <a:t> </a:t>
+            </a:r>
+            <a:r>
+              <a:rPr lang="ru-RU" dirty="0" smtClean="0"/>
+              <a:t>и вспомогательные классы для оптимизации работы</a:t>
+            </a:r>
+            <a:endParaRPr lang="ru-RU" dirty="0"/>
+          </a:p>
+        </p:txBody>
+      </p:sp>
+    </p:spTree>
+    <p:extLst>
+      <p:ext uri="{BB962C8B-B14F-4D97-AF65-F5344CB8AC3E}">
+        <p14:creationId xmlns:p14="http://schemas.microsoft.com/office/powerpoint/2010/main" val="3004414969"/>
+      </p:ext>
+    </p:extLst>
+  </p:cSld>
+  <p:clrMapOvr>
+    <a:masterClrMapping/>
+  </p:clrMapOvr>
+</p:sld>
+</file>
+
+<file path=ppt/slides/slide12.xml><?xml version="1.0" encoding="utf-8"?>
+<p:sld xmlns:a="http://schemas.openxmlformats.org/drawingml/2006/main" xmlns:r="http://schemas.openxmlformats.org/officeDocument/2006/relationships" xmlns:p="http://schemas.openxmlformats.org/presentationml/2006/main">
+  <p:cSld>
+    <p:spTree>
+      <p:nvGrpSpPr>
+        <p:cNvPr id="1" name=""/>
+        <p:cNvGrpSpPr/>
+        <p:nvPr/>
+      </p:nvGrpSpPr>
+      <p:grpSpPr>
+        <a:xfrm>
+          <a:off x="0" y="0"/>
+          <a:ext cx="0" cy="0"/>
+          <a:chOff x="0" y="0"/>
+          <a:chExt cx="0" cy="0"/>
+        </a:xfrm>
+      </p:grpSpPr>
+      <p:sp>
+        <p:nvSpPr>
+          <p:cNvPr id="2" name="Заголовок 1"/>
+          <p:cNvSpPr>
+            <a:spLocks noGrp="1"/>
+          </p:cNvSpPr>
+          <p:nvPr>
+            <p:ph type="title"/>
+          </p:nvPr>
+        </p:nvSpPr>
+        <p:spPr/>
+        <p:txBody>
+          <a:bodyPr/>
+          <a:lstStyle/>
+          <a:p>
+            <a:pPr algn="ctr"/>
+            <a:r>
+              <a:rPr lang="ru-RU" dirty="0" smtClean="0"/>
+              <a:t>Важные детали</a:t>
+            </a:r>
+            <a:endParaRPr lang="ru-RU" dirty="0"/>
+          </a:p>
+        </p:txBody>
+      </p:sp>
+      <p:pic>
+        <p:nvPicPr>
+          <p:cNvPr id="4" name="Объект 3"/>
+          <p:cNvPicPr>
+            <a:picLocks noGrp="1" noChangeAspect="1"/>
+          </p:cNvPicPr>
+          <p:nvPr>
+            <p:ph idx="1"/>
+          </p:nvPr>
+        </p:nvPicPr>
+        <p:blipFill>
+          <a:blip r:embed="rId2">
+            <a:extLst>
+              <a:ext uri="{28A0092B-C50C-407E-A947-70E740481C1C}">
+                <a14:useLocalDpi xmlns:a14="http://schemas.microsoft.com/office/drawing/2010/main" val="0"/>
+              </a:ext>
+            </a:extLst>
+          </a:blip>
+          <a:stretch>
+            <a:fillRect/>
+          </a:stretch>
+        </p:blipFill>
+        <p:spPr>
+          <a:xfrm>
+            <a:off x="2992437" y="2203490"/>
+            <a:ext cx="6267450" cy="3114675"/>
+          </a:xfrm>
+        </p:spPr>
+      </p:pic>
+      <p:sp>
+        <p:nvSpPr>
+          <p:cNvPr id="5" name="TextBox 4"/>
+          <p:cNvSpPr txBox="1"/>
+          <p:nvPr/>
+        </p:nvSpPr>
+        <p:spPr>
+          <a:xfrm>
+            <a:off x="4589075" y="1834158"/>
+            <a:ext cx="3074175" cy="369332"/>
+          </a:xfrm>
+          <a:prstGeom prst="rect">
+            <a:avLst/>
+          </a:prstGeom>
+          <a:noFill/>
+        </p:spPr>
+        <p:txBody>
+          <a:bodyPr wrap="none" rtlCol="0">
+            <a:spAutoFit/>
+          </a:bodyPr>
+          <a:lstStyle/>
+          <a:p>
+            <a:r>
+              <a:rPr lang="ru-RU" dirty="0" smtClean="0"/>
+              <a:t>Получение цвета для здания:</a:t>
+            </a:r>
+            <a:endParaRPr lang="ru-RU" dirty="0"/>
+          </a:p>
+        </p:txBody>
+      </p:sp>
+    </p:spTree>
+    <p:extLst>
+      <p:ext uri="{BB962C8B-B14F-4D97-AF65-F5344CB8AC3E}">
+        <p14:creationId xmlns:p14="http://schemas.microsoft.com/office/powerpoint/2010/main" val="3293144539"/>
+      </p:ext>
+    </p:extLst>
+  </p:cSld>
+  <p:clrMapOvr>
+    <a:masterClrMapping/>
+  </p:clrMapOvr>
+</p:sld>
+</file>
+
+<file path=ppt/slides/slide13.xml><?xml version="1.0" encoding="utf-8"?>
+<p:sld xmlns:a="http://schemas.openxmlformats.org/drawingml/2006/main" xmlns:r="http://schemas.openxmlformats.org/officeDocument/2006/relationships" xmlns:p="http://schemas.openxmlformats.org/presentationml/2006/main">
+  <p:cSld>
+    <p:spTree>
+      <p:nvGrpSpPr>
+        <p:cNvPr id="1" name=""/>
+        <p:cNvGrpSpPr/>
+        <p:nvPr/>
+      </p:nvGrpSpPr>
+      <p:grpSpPr>
+        <a:xfrm>
+          <a:off x="0" y="0"/>
+          <a:ext cx="0" cy="0"/>
+          <a:chOff x="0" y="0"/>
+          <a:chExt cx="0" cy="0"/>
+        </a:xfrm>
+      </p:grpSpPr>
+      <p:sp>
+        <p:nvSpPr>
+          <p:cNvPr id="2" name="Заголовок 1"/>
+          <p:cNvSpPr>
+            <a:spLocks noGrp="1"/>
+          </p:cNvSpPr>
+          <p:nvPr>
+            <p:ph type="title"/>
+          </p:nvPr>
+        </p:nvSpPr>
+        <p:spPr/>
+        <p:txBody>
+          <a:bodyPr/>
+          <a:lstStyle/>
+          <a:p>
+            <a:pPr algn="ctr"/>
+            <a:r>
+              <a:rPr lang="ru-RU" dirty="0"/>
+              <a:t>Важные детали</a:t>
+            </a:r>
+          </a:p>
+        </p:txBody>
+      </p:sp>
+      <p:pic>
+        <p:nvPicPr>
+          <p:cNvPr id="4" name="Объект 3"/>
+          <p:cNvPicPr>
+            <a:picLocks noGrp="1" noChangeAspect="1"/>
+          </p:cNvPicPr>
+          <p:nvPr>
+            <p:ph idx="1"/>
+          </p:nvPr>
+        </p:nvPicPr>
+        <p:blipFill>
+          <a:blip r:embed="rId2">
+            <a:extLst>
+              <a:ext uri="{28A0092B-C50C-407E-A947-70E740481C1C}">
+                <a14:useLocalDpi xmlns:a14="http://schemas.microsoft.com/office/drawing/2010/main" val="0"/>
+              </a:ext>
+            </a:extLst>
+          </a:blip>
+          <a:stretch>
+            <a:fillRect/>
+          </a:stretch>
+        </p:blipFill>
+        <p:spPr>
+          <a:xfrm>
+            <a:off x="3604635" y="2209234"/>
+            <a:ext cx="4940437" cy="4108592"/>
+          </a:xfrm>
+        </p:spPr>
+      </p:pic>
+      <p:sp>
+        <p:nvSpPr>
+          <p:cNvPr id="5" name="TextBox 4"/>
+          <p:cNvSpPr txBox="1"/>
+          <p:nvPr/>
+        </p:nvSpPr>
+        <p:spPr>
+          <a:xfrm>
+            <a:off x="3604635" y="1839902"/>
+            <a:ext cx="5043688" cy="369332"/>
+          </a:xfrm>
+          <a:prstGeom prst="rect">
+            <a:avLst/>
+          </a:prstGeom>
+          <a:noFill/>
+        </p:spPr>
+        <p:txBody>
+          <a:bodyPr wrap="none" rtlCol="0">
+            <a:spAutoFit/>
+          </a:bodyPr>
+          <a:lstStyle/>
+          <a:p>
+            <a:r>
+              <a:rPr lang="ru-RU" dirty="0" smtClean="0"/>
+              <a:t>Рассчет расстояний с помощью поиска в ширину:</a:t>
+            </a:r>
+            <a:endParaRPr lang="ru-RU" dirty="0"/>
+          </a:p>
+        </p:txBody>
+      </p:sp>
+    </p:spTree>
+    <p:extLst>
+      <p:ext uri="{BB962C8B-B14F-4D97-AF65-F5344CB8AC3E}">
+        <p14:creationId xmlns:p14="http://schemas.microsoft.com/office/powerpoint/2010/main" val="1143125878"/>
+      </p:ext>
+    </p:extLst>
+  </p:cSld>
+  <p:clrMapOvr>
+    <a:masterClrMapping/>
+  </p:clrMapOvr>
+  <p:timing>
+    <p:tnLst>
+      <p:par>
+        <p:cTn id="1" dur="indefinite" restart="never" nodeType="tmRoot"/>
+      </p:par>
+    </p:tnLst>
+  </p:timing>
+</p:sld>
+</file>
+
+<file path=ppt/slides/slide14.xml><?xml version="1.0" encoding="utf-8"?>
+<p:sld xmlns:a="http://schemas.openxmlformats.org/drawingml/2006/main" xmlns:r="http://schemas.openxmlformats.org/officeDocument/2006/relationships" xmlns:p="http://schemas.openxmlformats.org/presentationml/2006/main">
+  <p:cSld>
+    <p:spTree>
+      <p:nvGrpSpPr>
+        <p:cNvPr id="1" name=""/>
+        <p:cNvGrpSpPr/>
+        <p:nvPr/>
+      </p:nvGrpSpPr>
+      <p:grpSpPr>
+        <a:xfrm>
+          <a:off x="0" y="0"/>
+          <a:ext cx="0" cy="0"/>
+          <a:chOff x="0" y="0"/>
+          <a:chExt cx="0" cy="0"/>
+        </a:xfrm>
+      </p:grpSpPr>
+      <p:sp>
+        <p:nvSpPr>
+          <p:cNvPr id="2" name="Заголовок 1"/>
+          <p:cNvSpPr>
+            <a:spLocks noGrp="1"/>
+          </p:cNvSpPr>
+          <p:nvPr>
+            <p:ph type="title"/>
+          </p:nvPr>
+        </p:nvSpPr>
+        <p:spPr/>
+        <p:txBody>
+          <a:bodyPr/>
+          <a:lstStyle/>
+          <a:p>
+            <a:pPr algn="ctr"/>
+            <a:r>
+              <a:rPr lang="ru-RU" dirty="0" smtClean="0"/>
+              <a:t>Клиент</a:t>
+            </a:r>
+            <a:endParaRPr lang="ru-RU" dirty="0"/>
+          </a:p>
+        </p:txBody>
+      </p:sp>
+      <p:pic>
+        <p:nvPicPr>
+          <p:cNvPr id="4" name="Объект 3"/>
+          <p:cNvPicPr>
+            <a:picLocks noGrp="1" noChangeAspect="1"/>
+          </p:cNvPicPr>
+          <p:nvPr>
+            <p:ph idx="1"/>
+          </p:nvPr>
+        </p:nvPicPr>
+        <p:blipFill>
+          <a:blip r:embed="rId2" cstate="print">
+            <a:extLst>
+              <a:ext uri="{28A0092B-C50C-407E-A947-70E740481C1C}">
+                <a14:useLocalDpi xmlns:a14="http://schemas.microsoft.com/office/drawing/2010/main" val="0"/>
+              </a:ext>
+            </a:extLst>
+          </a:blip>
+          <a:stretch>
+            <a:fillRect/>
+          </a:stretch>
+        </p:blipFill>
+        <p:spPr>
+          <a:xfrm>
+            <a:off x="1776625" y="1737360"/>
+            <a:ext cx="8699710" cy="4600939"/>
+          </a:xfrm>
+        </p:spPr>
+      </p:pic>
+    </p:spTree>
+    <p:extLst>
+      <p:ext uri="{BB962C8B-B14F-4D97-AF65-F5344CB8AC3E}">
+        <p14:creationId xmlns:p14="http://schemas.microsoft.com/office/powerpoint/2010/main" val="1091194972"/>
+      </p:ext>
+    </p:extLst>
+  </p:cSld>
+  <p:clrMapOvr>
+    <a:masterClrMapping/>
+  </p:clrMapOvr>
+  <p:timing>
+    <p:tnLst>
+      <p:par>
+        <p:cTn id="1" dur="indefinite" restart="never" nodeType="tmRoot"/>
+      </p:par>
+    </p:tnLst>
+  </p:timing>
+</p:sld>
+</file>
+
+<file path=ppt/slides/slide15.xml><?xml version="1.0" encoding="utf-8"?>
+<p:sld xmlns:a="http://schemas.openxmlformats.org/drawingml/2006/main" xmlns:r="http://schemas.openxmlformats.org/officeDocument/2006/relationships" xmlns:p="http://schemas.openxmlformats.org/presentationml/2006/main">
+  <p:cSld>
+    <p:spTree>
+      <p:nvGrpSpPr>
+        <p:cNvPr id="1" name=""/>
+        <p:cNvGrpSpPr/>
+        <p:nvPr/>
+      </p:nvGrpSpPr>
+      <p:grpSpPr>
+        <a:xfrm>
+          <a:off x="0" y="0"/>
+          <a:ext cx="0" cy="0"/>
+          <a:chOff x="0" y="0"/>
+          <a:chExt cx="0" cy="0"/>
+        </a:xfrm>
+      </p:grpSpPr>
+      <p:sp>
+        <p:nvSpPr>
+          <p:cNvPr id="2" name="Заголовок 1"/>
+          <p:cNvSpPr>
+            <a:spLocks noGrp="1"/>
+          </p:cNvSpPr>
+          <p:nvPr>
+            <p:ph type="title"/>
+          </p:nvPr>
+        </p:nvSpPr>
+        <p:spPr/>
+        <p:txBody>
+          <a:bodyPr/>
+          <a:lstStyle/>
+          <a:p>
+            <a:pPr algn="ctr"/>
+            <a:r>
+              <a:rPr lang="ru-RU" dirty="0" smtClean="0"/>
+              <a:t>Ближайшие планы улучшений</a:t>
+            </a:r>
+            <a:endParaRPr lang="ru-RU" dirty="0"/>
+          </a:p>
+        </p:txBody>
+      </p:sp>
+      <p:sp>
+        <p:nvSpPr>
+          <p:cNvPr id="3" name="Объект 2"/>
+          <p:cNvSpPr>
+            <a:spLocks noGrp="1"/>
+          </p:cNvSpPr>
+          <p:nvPr>
+            <p:ph idx="1"/>
+          </p:nvPr>
+        </p:nvSpPr>
+        <p:spPr/>
+        <p:txBody>
+          <a:bodyPr/>
+          <a:lstStyle/>
+          <a:p>
+            <a:pPr lvl="1">
+              <a:buFont typeface="Arial" panose="020B0604020202020204" pitchFamily="34" charset="0"/>
+              <a:buChar char="•"/>
+            </a:pPr>
+            <a:r>
+              <a:rPr lang="ru-RU" dirty="0" smtClean="0"/>
+              <a:t>Перенос рендера тайлов на более производительную библиотеку или на сторону клиента</a:t>
+            </a:r>
+          </a:p>
+          <a:p>
+            <a:pPr lvl="1">
+              <a:buFont typeface="Arial" panose="020B0604020202020204" pitchFamily="34" charset="0"/>
+              <a:buChar char="•"/>
+            </a:pPr>
+            <a:endParaRPr lang="ru-RU" dirty="0"/>
+          </a:p>
+          <a:p>
+            <a:pPr lvl="1">
+              <a:buFont typeface="Arial" panose="020B0604020202020204" pitchFamily="34" charset="0"/>
+              <a:buChar char="•"/>
+            </a:pPr>
+            <a:r>
+              <a:rPr lang="ru-RU" dirty="0" smtClean="0"/>
+              <a:t>Добавление поддержки дополнительных видов транспорта</a:t>
+            </a:r>
+          </a:p>
+          <a:p>
+            <a:pPr lvl="1">
+              <a:buFont typeface="Arial" panose="020B0604020202020204" pitchFamily="34" charset="0"/>
+              <a:buChar char="•"/>
+            </a:pPr>
+            <a:endParaRPr lang="ru-RU" dirty="0" smtClean="0"/>
+          </a:p>
+          <a:p>
+            <a:pPr lvl="1">
+              <a:buFont typeface="Arial" panose="020B0604020202020204" pitchFamily="34" charset="0"/>
+              <a:buChar char="•"/>
+            </a:pPr>
+            <a:r>
+              <a:rPr lang="en-US" dirty="0" smtClean="0"/>
+              <a:t>Web</a:t>
+            </a:r>
+            <a:r>
+              <a:rPr lang="ru-RU" dirty="0" smtClean="0"/>
+              <a:t> клиент</a:t>
+            </a:r>
+          </a:p>
+          <a:p>
+            <a:pPr lvl="1">
+              <a:buFont typeface="Arial" panose="020B0604020202020204" pitchFamily="34" charset="0"/>
+              <a:buChar char="•"/>
+            </a:pPr>
+            <a:endParaRPr lang="ru-RU" dirty="0"/>
+          </a:p>
+          <a:p>
+            <a:pPr lvl="1">
+              <a:buFont typeface="Arial" panose="020B0604020202020204" pitchFamily="34" charset="0"/>
+              <a:buChar char="•"/>
+            </a:pPr>
+            <a:r>
+              <a:rPr lang="ru-RU" dirty="0" smtClean="0"/>
+              <a:t>Расширение «обычного» функционала карты</a:t>
+            </a:r>
+          </a:p>
+          <a:p>
+            <a:pPr lvl="1">
+              <a:buFont typeface="Arial" panose="020B0604020202020204" pitchFamily="34" charset="0"/>
+              <a:buChar char="•"/>
+            </a:pPr>
+            <a:endParaRPr lang="ru-RU" dirty="0"/>
+          </a:p>
+          <a:p>
+            <a:pPr lvl="1">
+              <a:buFont typeface="Arial" panose="020B0604020202020204" pitchFamily="34" charset="0"/>
+              <a:buChar char="•"/>
+            </a:pPr>
+            <a:endParaRPr lang="ru-RU" dirty="0" smtClean="0"/>
+          </a:p>
+          <a:p>
+            <a:pPr lvl="1">
+              <a:buFont typeface="Arial" panose="020B0604020202020204" pitchFamily="34" charset="0"/>
+              <a:buChar char="•"/>
+            </a:pPr>
+            <a:endParaRPr lang="ru-RU" dirty="0" smtClean="0"/>
+          </a:p>
+          <a:p>
+            <a:pPr lvl="1">
+              <a:buFont typeface="Arial" panose="020B0604020202020204" pitchFamily="34" charset="0"/>
+              <a:buChar char="•"/>
+            </a:pPr>
+            <a:endParaRPr lang="ru-RU" dirty="0"/>
+          </a:p>
+          <a:p>
+            <a:pPr lvl="1">
+              <a:buFont typeface="Arial" panose="020B0604020202020204" pitchFamily="34" charset="0"/>
+              <a:buChar char="•"/>
+            </a:pPr>
+            <a:endParaRPr lang="ru-RU" dirty="0"/>
+          </a:p>
+          <a:p>
+            <a:pPr lvl="1">
+              <a:buFont typeface="Arial" panose="020B0604020202020204" pitchFamily="34" charset="0"/>
+              <a:buChar char="•"/>
+            </a:pPr>
+            <a:endParaRPr lang="ru-RU" dirty="0"/>
+          </a:p>
+        </p:txBody>
+      </p:sp>
+    </p:spTree>
+    <p:extLst>
+      <p:ext uri="{BB962C8B-B14F-4D97-AF65-F5344CB8AC3E}">
+        <p14:creationId xmlns:p14="http://schemas.microsoft.com/office/powerpoint/2010/main" val="2311549563"/>
+      </p:ext>
+    </p:extLst>
+  </p:cSld>
+  <p:clrMapOvr>
+    <a:masterClrMapping/>
+  </p:clrMapOvr>
+</p:sld>
+</file>
+
+<file path=ppt/slides/slide16.xml><?xml version="1.0" encoding="utf-8"?>
+<p:sld xmlns:a="http://schemas.openxmlformats.org/drawingml/2006/main" xmlns:r="http://schemas.openxmlformats.org/officeDocument/2006/relationships" xmlns:p="http://schemas.openxmlformats.org/presentationml/2006/main">
+  <p:cSld>
+    <p:spTree>
+      <p:nvGrpSpPr>
+        <p:cNvPr id="1" name=""/>
+        <p:cNvGrpSpPr/>
+        <p:nvPr/>
+      </p:nvGrpSpPr>
+      <p:grpSpPr>
+        <a:xfrm>
+          <a:off x="0" y="0"/>
+          <a:ext cx="0" cy="0"/>
+          <a:chOff x="0" y="0"/>
+          <a:chExt cx="0" cy="0"/>
+        </a:xfrm>
+      </p:grpSpPr>
+      <p:sp>
+        <p:nvSpPr>
+          <p:cNvPr id="2" name="Заголовок 1"/>
+          <p:cNvSpPr>
+            <a:spLocks noGrp="1"/>
+          </p:cNvSpPr>
+          <p:nvPr>
+            <p:ph type="title"/>
+          </p:nvPr>
+        </p:nvSpPr>
+        <p:spPr/>
+        <p:txBody>
+          <a:bodyPr/>
+          <a:lstStyle/>
+          <a:p>
+            <a:pPr algn="ctr"/>
+            <a:r>
+              <a:rPr lang="ru-RU" dirty="0" smtClean="0"/>
+              <a:t>Итог</a:t>
+            </a:r>
+            <a:endParaRPr lang="ru-RU" dirty="0"/>
+          </a:p>
+        </p:txBody>
+      </p:sp>
+      <p:sp>
+        <p:nvSpPr>
+          <p:cNvPr id="3" name="Объект 2"/>
+          <p:cNvSpPr>
+            <a:spLocks noGrp="1"/>
+          </p:cNvSpPr>
+          <p:nvPr>
+            <p:ph idx="1"/>
+          </p:nvPr>
+        </p:nvSpPr>
+        <p:spPr/>
+        <p:txBody>
+          <a:bodyPr/>
+          <a:lstStyle/>
+          <a:p>
+            <a:pPr lvl="1">
+              <a:buFont typeface="Arial" panose="020B0604020202020204" pitchFamily="34" charset="0"/>
+              <a:buChar char="•"/>
+            </a:pPr>
+            <a:r>
+              <a:rPr lang="ru-RU" dirty="0" smtClean="0"/>
+              <a:t>Был создан прототип «Тепловых» карт</a:t>
+            </a:r>
+          </a:p>
+          <a:p>
+            <a:pPr lvl="1">
+              <a:buFont typeface="Arial" panose="020B0604020202020204" pitchFamily="34" charset="0"/>
+              <a:buChar char="•"/>
+            </a:pPr>
+            <a:endParaRPr lang="ru-RU" dirty="0"/>
+          </a:p>
+          <a:p>
+            <a:pPr lvl="1">
+              <a:buFont typeface="Arial" panose="020B0604020202020204" pitchFamily="34" charset="0"/>
+              <a:buChar char="•"/>
+            </a:pPr>
+            <a:r>
+              <a:rPr lang="ru-RU" dirty="0" smtClean="0"/>
+              <a:t>Мною были изучены способы обработки </a:t>
+            </a:r>
+            <a:r>
+              <a:rPr lang="en-US" dirty="0" smtClean="0"/>
+              <a:t>gis</a:t>
+            </a:r>
+            <a:r>
+              <a:rPr lang="ru-RU" dirty="0" smtClean="0"/>
+              <a:t> информации и принципы создания веб серверов</a:t>
+            </a:r>
+          </a:p>
+          <a:p>
+            <a:pPr lvl="1">
+              <a:buFont typeface="Arial" panose="020B0604020202020204" pitchFamily="34" charset="0"/>
+              <a:buChar char="•"/>
+            </a:pPr>
+            <a:endParaRPr lang="ru-RU" dirty="0"/>
+          </a:p>
+          <a:p>
+            <a:pPr lvl="1">
+              <a:buFont typeface="Arial" panose="020B0604020202020204" pitchFamily="34" charset="0"/>
+              <a:buChar char="•"/>
+            </a:pPr>
+            <a:r>
+              <a:rPr lang="ru-RU" dirty="0" smtClean="0"/>
+              <a:t>Изучены плюсы и минусы открытых данных</a:t>
+            </a:r>
+          </a:p>
+          <a:p>
+            <a:pPr lvl="1">
+              <a:buFont typeface="Arial" panose="020B0604020202020204" pitchFamily="34" charset="0"/>
+              <a:buChar char="•"/>
+            </a:pPr>
+            <a:endParaRPr lang="ru-RU" dirty="0"/>
+          </a:p>
+          <a:p>
+            <a:pPr lvl="1">
+              <a:buFont typeface="Arial" panose="020B0604020202020204" pitchFamily="34" charset="0"/>
+              <a:buChar char="•"/>
+            </a:pPr>
+            <a:r>
+              <a:rPr lang="ru-RU" dirty="0" smtClean="0"/>
+              <a:t>Получен опыт работы с </a:t>
+            </a:r>
+            <a:r>
+              <a:rPr lang="en-US" smtClean="0"/>
+              <a:t>git</a:t>
+            </a:r>
+            <a:endParaRPr lang="ru-RU" dirty="0"/>
+          </a:p>
+        </p:txBody>
+      </p:sp>
+    </p:spTree>
+    <p:extLst>
+      <p:ext uri="{BB962C8B-B14F-4D97-AF65-F5344CB8AC3E}">
+        <p14:creationId xmlns:p14="http://schemas.microsoft.com/office/powerpoint/2010/main" val="527935307"/>
+      </p:ext>
+    </p:extLst>
+  </p:cSld>
+  <p:clrMapOvr>
+    <a:masterClrMapping/>
+  </p:clrMapOvr>
+</p:sld>
+</file>
+
 <file path=ppt/slides/slide2.xml><?xml version="1.0" encoding="utf-8"?>
 <p:sld xmlns:a="http://schemas.openxmlformats.org/drawingml/2006/main" xmlns:r="http://schemas.openxmlformats.org/officeDocument/2006/relationships" xmlns:p="http://schemas.openxmlformats.org/presentationml/2006/main">
   <p:cSld>
@@ -3950,9 +4940,16 @@
             <p:ph idx="1"/>
           </p:nvPr>
         </p:nvSpPr>
-        <p:spPr/>
-        <p:txBody>
-          <a:bodyPr/>
+        <p:spPr>
+          <a:xfrm>
+            <a:off x="1097280" y="1845734"/>
+            <a:ext cx="10058400" cy="4255808"/>
+          </a:xfrm>
+        </p:spPr>
+        <p:txBody>
+          <a:bodyPr>
+            <a:normAutofit/>
+          </a:bodyPr>
           <a:lstStyle/>
           <a:p>
             <a:pPr marL="0" indent="0">
@@ -3970,7 +4967,19 @@
             </a:pPr>
             <a:r>
               <a:rPr lang="ru-RU" dirty="0" smtClean="0"/>
-              <a:t>Создать программу визуализирующую предложения жилья с помощью цветовых карт</a:t>
+              <a:t>Создать программу визуализирующую предложения жилья с помощью </a:t>
+            </a:r>
+            <a:r>
+              <a:rPr lang="ru-RU" dirty="0" smtClean="0"/>
+              <a:t>тепловый</a:t>
+            </a:r>
+            <a:r>
+              <a:rPr lang="ru-RU" dirty="0" smtClean="0"/>
+              <a:t> </a:t>
+            </a:r>
+            <a:r>
+              <a:rPr lang="ru-RU" dirty="0" smtClean="0"/>
+              <a:t>карт</a:t>
             </a:r>
           </a:p>
           <a:p>
@@ -3989,18 +4998,78 @@
             </a:pPr>
             <a:r>
               <a:rPr lang="ru-RU" dirty="0" smtClean="0"/>
-              <a:t>Исследовать имеющиеся предложения на рынке подобных программ</a:t>
-            </a:r>
-          </a:p>
-          <a:p>
-            <a:pPr lvl="1">
-              <a:buFont typeface="Arial" panose="020B0604020202020204" pitchFamily="34" charset="0"/>
-              <a:buChar char="•"/>
-            </a:pPr>
-            <a:r>
-              <a:rPr lang="ru-RU" dirty="0" smtClean="0"/>
-              <a:t>Выяснить преимущества моей программы перед другими имеющимися</a:t>
-            </a:r>
+              <a:t>Исследовать имеющиеся предложения на рынке подобных </a:t>
+            </a:r>
+            <a:r>
+              <a:rPr lang="ru-RU" dirty="0" smtClean="0"/>
+              <a:t>программ</a:t>
+            </a:r>
+          </a:p>
+          <a:p>
+            <a:pPr lvl="1">
+              <a:buFont typeface="Arial" panose="020B0604020202020204" pitchFamily="34" charset="0"/>
+              <a:buChar char="•"/>
+            </a:pPr>
+            <a:r>
+              <a:rPr lang="ru-RU" dirty="0" smtClean="0"/>
+              <a:t>Сформировать концепт программы</a:t>
+            </a:r>
+            <a:endParaRPr lang="ru-RU" dirty="0" smtClean="0"/>
+          </a:p>
+          <a:p>
+            <a:pPr lvl="1">
+              <a:buFont typeface="Arial" panose="020B0604020202020204" pitchFamily="34" charset="0"/>
+              <a:buChar char="•"/>
+            </a:pPr>
+            <a:r>
+              <a:rPr lang="ru-RU" dirty="0" smtClean="0"/>
+              <a:t>Выяснить преимущества моей программы перед другими </a:t>
+            </a:r>
+            <a:r>
+              <a:rPr lang="ru-RU" dirty="0" smtClean="0"/>
+              <a:t>имеющимися</a:t>
+            </a:r>
+          </a:p>
+          <a:p>
+            <a:pPr lvl="1">
+              <a:buFont typeface="Arial" panose="020B0604020202020204" pitchFamily="34" charset="0"/>
+              <a:buChar char="•"/>
+            </a:pPr>
+            <a:r>
+              <a:rPr lang="ru-RU" dirty="0" smtClean="0"/>
+              <a:t>Найти источники данных</a:t>
+            </a:r>
+            <a:endParaRPr lang="ru-RU" dirty="0" smtClean="0"/>
+          </a:p>
+          <a:p>
+            <a:pPr lvl="1">
+              <a:buFont typeface="Arial" panose="020B0604020202020204" pitchFamily="34" charset="0"/>
+              <a:buChar char="•"/>
+            </a:pPr>
+            <a:r>
+              <a:rPr lang="ru-RU" dirty="0" smtClean="0"/>
+              <a:t>Изучить методы обработки географической информации</a:t>
+            </a:r>
+            <a:endParaRPr lang="en-US" dirty="0" smtClean="0"/>
+          </a:p>
+          <a:p>
+            <a:pPr lvl="1">
+              <a:buFont typeface="Arial" panose="020B0604020202020204" pitchFamily="34" charset="0"/>
+              <a:buChar char="•"/>
+            </a:pPr>
+            <a:r>
+              <a:rPr lang="ru-RU" dirty="0" smtClean="0"/>
+              <a:t>Выбрать </a:t>
+            </a:r>
+            <a:r>
+              <a:rPr lang="ru-RU" dirty="0"/>
+              <a:t>принцип клиент-серверного обмена </a:t>
+            </a:r>
+            <a:r>
+              <a:rPr lang="ru-RU" dirty="0" smtClean="0"/>
+              <a:t>информации</a:t>
+            </a:r>
+            <a:endParaRPr lang="ru-RU" dirty="0" smtClean="0"/>
           </a:p>
           <a:p>
             <a:pPr lvl="1">
@@ -4027,34 +5096,31 @@
             </a:pPr>
             <a:r>
               <a:rPr lang="ru-RU" dirty="0" smtClean="0"/>
-              <a:t>Создать структуру программы</a:t>
-            </a:r>
-          </a:p>
-          <a:p>
-            <a:pPr lvl="1">
-              <a:buFont typeface="Arial" panose="020B0604020202020204" pitchFamily="34" charset="0"/>
-              <a:buChar char="•"/>
-            </a:pPr>
-            <a:r>
-              <a:rPr lang="ru-RU" dirty="0" smtClean="0"/>
-              <a:t>Выбрать принцип клиент-серверного обмена информации</a:t>
-            </a:r>
-          </a:p>
-          <a:p>
-            <a:pPr lvl="1">
-              <a:buFont typeface="Arial" panose="020B0604020202020204" pitchFamily="34" charset="0"/>
-              <a:buChar char="•"/>
-            </a:pPr>
-            <a:r>
-              <a:rPr lang="ru-RU" dirty="0" smtClean="0"/>
-              <a:t>Разработать интерфейс клиента</a:t>
-            </a:r>
-          </a:p>
-          <a:p>
-            <a:pPr lvl="1">
-              <a:buFont typeface="Arial" panose="020B0604020202020204" pitchFamily="34" charset="0"/>
-              <a:buChar char="•"/>
-            </a:pPr>
+              <a:t>Создать структуру </a:t>
+            </a:r>
+            <a:r>
+              <a:rPr lang="ru-RU" dirty="0" smtClean="0"/>
+              <a:t>программы</a:t>
+            </a:r>
+            <a:r>
+              <a:rPr lang="en-US" dirty="0" smtClean="0"/>
+              <a:t> </a:t>
+            </a:r>
+            <a:r>
+              <a:rPr lang="ru-RU" dirty="0" smtClean="0"/>
+              <a:t>и написать её</a:t>
+            </a:r>
+            <a:endParaRPr lang="ru-RU" dirty="0" smtClean="0"/>
+          </a:p>
+          <a:p>
+            <a:pPr lvl="1">
+              <a:buFont typeface="Arial" panose="020B0604020202020204" pitchFamily="34" charset="0"/>
+              <a:buChar char="•"/>
+            </a:pPr>
+            <a:r>
+              <a:rPr lang="ru-RU" dirty="0" smtClean="0"/>
+              <a:t>Разработать клиент</a:t>
+            </a:r>
             <a:endParaRPr lang="ru-RU" dirty="0" smtClean="0"/>
           </a:p>
           <a:p>
@@ -4134,87 +5200,11 @@
             <a:pPr algn="ctr"/>
             <a:r>
               <a:rPr lang="ru-RU" dirty="0" smtClean="0"/>
-              <a:t>Содержание</a:t>
-            </a:r>
-            <a:endParaRPr lang="ru-RU" dirty="0"/>
-          </a:p>
-        </p:txBody>
-      </p:sp>
-      <p:sp>
-        <p:nvSpPr>
-          <p:cNvPr id="3" name="Content Placeholder 2"/>
-          <p:cNvSpPr>
-            <a:spLocks noGrp="1"/>
-          </p:cNvSpPr>
-          <p:nvPr>
-            <p:ph idx="1"/>
-          </p:nvPr>
-        </p:nvSpPr>
-        <p:spPr/>
-        <p:txBody>
-          <a:bodyPr/>
-          <a:lstStyle/>
-          <a:p>
-            <a:endParaRPr lang="ru-RU" dirty="0"/>
-          </a:p>
-        </p:txBody>
-      </p:sp>
-    </p:spTree>
-    <p:extLst>
-      <p:ext uri="{BB962C8B-B14F-4D97-AF65-F5344CB8AC3E}">
-        <p14:creationId xmlns:p14="http://schemas.microsoft.com/office/powerpoint/2010/main" val="3465070351"/>
-      </p:ext>
-    </p:extLst>
-  </p:cSld>
-  <p:clrMapOvr>
-    <a:masterClrMapping/>
-  </p:clrMapOvr>
-  <p:timing>
-    <p:tnLst>
-      <p:par>
-        <p:cTn id="1" dur="indefinite" restart="never" nodeType="tmRoot"/>
-      </p:par>
-    </p:tnLst>
-  </p:timing>
-</p:sld>
-</file>
-
-<file path=ppt/slides/slide4.xml><?xml version="1.0" encoding="utf-8"?>
-<p:sld xmlns:a="http://schemas.openxmlformats.org/drawingml/2006/main" xmlns:r="http://schemas.openxmlformats.org/officeDocument/2006/relationships" xmlns:p="http://schemas.openxmlformats.org/presentationml/2006/main">
-  <p:cSld>
-    <p:spTree>
-      <p:nvGrpSpPr>
-        <p:cNvPr id="1" name=""/>
-        <p:cNvGrpSpPr/>
-        <p:nvPr/>
-      </p:nvGrpSpPr>
-      <p:grpSpPr>
-        <a:xfrm>
-          <a:off x="0" y="0"/>
-          <a:ext cx="0" cy="0"/>
-          <a:chOff x="0" y="0"/>
-          <a:chExt cx="0" cy="0"/>
-        </a:xfrm>
-      </p:grpSpPr>
-      <p:sp>
-        <p:nvSpPr>
-          <p:cNvPr id="2" name="Title 1"/>
-          <p:cNvSpPr>
-            <a:spLocks noGrp="1"/>
-          </p:cNvSpPr>
-          <p:nvPr>
-            <p:ph type="title"/>
-          </p:nvPr>
-        </p:nvSpPr>
-        <p:spPr/>
-        <p:txBody>
-          <a:bodyPr/>
-          <a:lstStyle/>
-          <a:p>
-            <a:pPr algn="ctr"/>
-            <a:r>
-              <a:rPr lang="ru-RU" dirty="0" smtClean="0"/>
-              <a:t>Существующие альтернативы</a:t>
+              <a:t>Существующие </a:t>
+            </a:r>
+            <a:r>
+              <a:rPr lang="ru-RU" dirty="0" smtClean="0"/>
+              <a:t>продукты</a:t>
             </a:r>
             <a:endParaRPr lang="ru-RU" dirty="0"/>
           </a:p>
@@ -4376,6 +5366,169 @@
 </p:sld>
 </file>
 
+<file path=ppt/slides/slide4.xml><?xml version="1.0" encoding="utf-8"?>
+<p:sld xmlns:a="http://schemas.openxmlformats.org/drawingml/2006/main" xmlns:r="http://schemas.openxmlformats.org/officeDocument/2006/relationships" xmlns:p="http://schemas.openxmlformats.org/presentationml/2006/main">
+  <p:cSld>
+    <p:spTree>
+      <p:nvGrpSpPr>
+        <p:cNvPr id="1" name=""/>
+        <p:cNvGrpSpPr/>
+        <p:nvPr/>
+      </p:nvGrpSpPr>
+      <p:grpSpPr>
+        <a:xfrm>
+          <a:off x="0" y="0"/>
+          <a:ext cx="0" cy="0"/>
+          <a:chOff x="0" y="0"/>
+          <a:chExt cx="0" cy="0"/>
+        </a:xfrm>
+      </p:grpSpPr>
+      <p:sp>
+        <p:nvSpPr>
+          <p:cNvPr id="2" name="Title 1"/>
+          <p:cNvSpPr>
+            <a:spLocks noGrp="1"/>
+          </p:cNvSpPr>
+          <p:nvPr>
+            <p:ph type="title"/>
+          </p:nvPr>
+        </p:nvSpPr>
+        <p:spPr/>
+        <p:txBody>
+          <a:bodyPr/>
+          <a:lstStyle/>
+          <a:p>
+            <a:pPr algn="ctr"/>
+            <a:r>
+              <a:rPr lang="ru-RU" dirty="0" smtClean="0"/>
+              <a:t>Концепция</a:t>
+            </a:r>
+            <a:endParaRPr lang="ru-RU" dirty="0"/>
+          </a:p>
+        </p:txBody>
+      </p:sp>
+      <p:sp>
+        <p:nvSpPr>
+          <p:cNvPr id="3" name="Content Placeholder 2"/>
+          <p:cNvSpPr>
+            <a:spLocks noGrp="1"/>
+          </p:cNvSpPr>
+          <p:nvPr>
+            <p:ph idx="1"/>
+          </p:nvPr>
+        </p:nvSpPr>
+        <p:spPr/>
+        <p:txBody>
+          <a:bodyPr/>
+          <a:lstStyle/>
+          <a:p>
+            <a:pPr lvl="1">
+              <a:buFont typeface="Arial" panose="020B0604020202020204" pitchFamily="34" charset="0"/>
+              <a:buChar char="•"/>
+            </a:pPr>
+            <a:r>
+              <a:rPr lang="ru-RU" dirty="0" smtClean="0"/>
+              <a:t>Цвет – отличный способ представления больших объемов информации</a:t>
+            </a:r>
+          </a:p>
+          <a:p>
+            <a:pPr lvl="1">
+              <a:buFont typeface="Arial" panose="020B0604020202020204" pitchFamily="34" charset="0"/>
+              <a:buChar char="•"/>
+            </a:pPr>
+            <a:endParaRPr lang="ru-RU" dirty="0" smtClean="0"/>
+          </a:p>
+          <a:p>
+            <a:pPr lvl="1">
+              <a:buFont typeface="Arial" panose="020B0604020202020204" pitchFamily="34" charset="0"/>
+              <a:buChar char="•"/>
+            </a:pPr>
+            <a:r>
+              <a:rPr lang="ru-RU" dirty="0" smtClean="0"/>
+              <a:t>Подсознательная ассоциация более красных оттенков как более высоких</a:t>
+            </a:r>
+            <a:r>
+              <a:rPr lang="en-US" dirty="0" smtClean="0"/>
+              <a:t>/</a:t>
+            </a:r>
+            <a:r>
+              <a:rPr lang="ru-RU" dirty="0" smtClean="0"/>
+              <a:t>больших и синих как наоборот низких</a:t>
+            </a:r>
+            <a:r>
+              <a:rPr lang="en-US" dirty="0" smtClean="0"/>
+              <a:t>/</a:t>
+            </a:r>
+            <a:r>
+              <a:rPr lang="ru-RU" dirty="0" smtClean="0"/>
+              <a:t>меньших поможет с отображием отклонения цены от целевой</a:t>
+            </a:r>
+          </a:p>
+          <a:p>
+            <a:pPr lvl="1">
+              <a:buFont typeface="Arial" panose="020B0604020202020204" pitchFamily="34" charset="0"/>
+              <a:buChar char="•"/>
+            </a:pPr>
+            <a:endParaRPr lang="ru-RU" dirty="0" smtClean="0"/>
+          </a:p>
+          <a:p>
+            <a:pPr lvl="1">
+              <a:buFont typeface="Arial" panose="020B0604020202020204" pitchFamily="34" charset="0"/>
+              <a:buChar char="•"/>
+            </a:pPr>
+            <a:r>
+              <a:rPr lang="ru-RU" dirty="0" smtClean="0"/>
+              <a:t>Для перехода от теплых оттенков к холодным идеально подходит </a:t>
+            </a:r>
+            <a:r>
+              <a:rPr lang="en-US" dirty="0" smtClean="0"/>
+              <a:t>HSB</a:t>
+            </a:r>
+            <a:r>
+              <a:rPr lang="ru-RU" dirty="0" smtClean="0"/>
+              <a:t> палитра</a:t>
+            </a:r>
+          </a:p>
+          <a:p>
+            <a:pPr lvl="1">
+              <a:buFont typeface="Arial" panose="020B0604020202020204" pitchFamily="34" charset="0"/>
+              <a:buChar char="•"/>
+            </a:pPr>
+            <a:endParaRPr lang="ru-RU" dirty="0" smtClean="0"/>
+          </a:p>
+          <a:p>
+            <a:pPr lvl="1">
+              <a:buFont typeface="Arial" panose="020B0604020202020204" pitchFamily="34" charset="0"/>
+              <a:buChar char="•"/>
+            </a:pPr>
+            <a:r>
+              <a:rPr lang="ru-RU" dirty="0" smtClean="0"/>
+              <a:t>Кроме цен, с помощью цвета можно показывать места, до которых можно достаточно быстро добратся из дома</a:t>
+            </a:r>
+            <a:endParaRPr lang="ru-RU" dirty="0"/>
+          </a:p>
+        </p:txBody>
+      </p:sp>
+    </p:spTree>
+    <p:extLst>
+      <p:ext uri="{BB962C8B-B14F-4D97-AF65-F5344CB8AC3E}">
+        <p14:creationId xmlns:p14="http://schemas.microsoft.com/office/powerpoint/2010/main" val="680305272"/>
+      </p:ext>
+    </p:extLst>
+  </p:cSld>
+  <p:clrMapOvr>
+    <a:masterClrMapping/>
+  </p:clrMapOvr>
+  <p:timing>
+    <p:tnLst>
+      <p:par>
+        <p:cTn id="1" dur="indefinite" restart="never" nodeType="tmRoot"/>
+      </p:par>
+    </p:tnLst>
+  </p:timing>
+</p:sld>
+</file>
+
 <file path=ppt/slides/slide5.xml><?xml version="1.0" encoding="utf-8"?>
 <p:sld xmlns:a="http://schemas.openxmlformats.org/drawingml/2006/main" xmlns:r="http://schemas.openxmlformats.org/officeDocument/2006/relationships" xmlns:p="http://schemas.openxmlformats.org/presentationml/2006/main">
   <p:cSld>
@@ -4395,7 +5548,7 @@
       </p:grpSpPr>
       <p:sp>
         <p:nvSpPr>
-          <p:cNvPr id="2" name="Title 1"/>
+          <p:cNvPr id="2" name="Заголовок 1"/>
           <p:cNvSpPr>
             <a:spLocks noGrp="1"/>
           </p:cNvSpPr>
@@ -4408,13 +5561,18 @@
           <a:bodyPr/>
           <a:lstStyle/>
           <a:p>
-            <a:endParaRPr lang="ru-RU"/>
-          </a:p>
-        </p:txBody>
-      </p:sp>
-      <p:sp>
-        <p:nvSpPr>
-          <p:cNvPr id="3" name="Content Placeholder 2"/>
+            <a:pPr algn="ctr"/>
+            <a:r>
+              <a:rPr lang="ru-RU" dirty="0" smtClean="0"/>
+              <a:t>Преимущества</a:t>
+            </a:r>
+            <a:endParaRPr lang="ru-RU" dirty="0"/>
+          </a:p>
+        </p:txBody>
+      </p:sp>
+      <p:sp>
+        <p:nvSpPr>
+          <p:cNvPr id="3" name="Объект 2"/>
           <p:cNvSpPr>
             <a:spLocks noGrp="1"/>
           </p:cNvSpPr>
@@ -4427,27 +5585,706 @@
           <a:bodyPr/>
           <a:lstStyle/>
           <a:p>
-            <a:endParaRPr lang="ru-RU"/>
+            <a:pPr lvl="1">
+              <a:buFont typeface="Arial" panose="020B0604020202020204" pitchFamily="34" charset="0"/>
+              <a:buChar char="•"/>
+            </a:pPr>
+            <a:r>
+              <a:rPr lang="ru-RU" dirty="0" smtClean="0"/>
+              <a:t>Больший объем информации умещается на экране</a:t>
+            </a:r>
+          </a:p>
+          <a:p>
+            <a:pPr lvl="1">
+              <a:buFont typeface="Arial" panose="020B0604020202020204" pitchFamily="34" charset="0"/>
+              <a:buChar char="•"/>
+            </a:pPr>
+            <a:endParaRPr lang="ru-RU" dirty="0"/>
+          </a:p>
+          <a:p>
+            <a:pPr lvl="1">
+              <a:buFont typeface="Arial" panose="020B0604020202020204" pitchFamily="34" charset="0"/>
+              <a:buChar char="•"/>
+            </a:pPr>
+            <a:r>
+              <a:rPr lang="ru-RU" dirty="0" smtClean="0"/>
+              <a:t>Возможность принимать более взвешенные решения</a:t>
+            </a:r>
+          </a:p>
+          <a:p>
+            <a:pPr lvl="1">
+              <a:buFont typeface="Arial" panose="020B0604020202020204" pitchFamily="34" charset="0"/>
+              <a:buChar char="•"/>
+            </a:pPr>
+            <a:endParaRPr lang="ru-RU" dirty="0"/>
+          </a:p>
+          <a:p>
+            <a:pPr lvl="1">
+              <a:buFont typeface="Arial" panose="020B0604020202020204" pitchFamily="34" charset="0"/>
+              <a:buChar char="•"/>
+            </a:pPr>
+            <a:r>
+              <a:rPr lang="ru-RU" dirty="0" smtClean="0"/>
+              <a:t>Простой способ оценить транспортную доступность дома</a:t>
+            </a:r>
+          </a:p>
+          <a:p>
+            <a:pPr lvl="1">
+              <a:buFont typeface="Arial" panose="020B0604020202020204" pitchFamily="34" charset="0"/>
+              <a:buChar char="•"/>
+            </a:pPr>
+            <a:endParaRPr lang="ru-RU" dirty="0"/>
+          </a:p>
+          <a:p>
+            <a:pPr lvl="1">
+              <a:buFont typeface="Arial" panose="020B0604020202020204" pitchFamily="34" charset="0"/>
+              <a:buChar char="•"/>
+            </a:pPr>
+            <a:r>
+              <a:rPr lang="ru-RU" dirty="0" smtClean="0"/>
+              <a:t>Уникальность</a:t>
+            </a:r>
+            <a:endParaRPr lang="ru-RU" dirty="0"/>
           </a:p>
         </p:txBody>
       </p:sp>
     </p:spTree>
     <p:extLst>
       <p:ext uri="{BB962C8B-B14F-4D97-AF65-F5344CB8AC3E}">
-        <p14:creationId xmlns:p14="http://schemas.microsoft.com/office/powerpoint/2010/main" val="680305272"/>
+        <p14:creationId xmlns:p14="http://schemas.microsoft.com/office/powerpoint/2010/main" val="1996336637"/>
       </p:ext>
     </p:extLst>
   </p:cSld>
   <p:clrMapOvr>
     <a:masterClrMapping/>
   </p:clrMapOvr>
-  <p:timing>
-    <p:tnLst>
-      <p:par>
-        <p:cTn id="1" dur="indefinite" restart="never" nodeType="tmRoot"/>
-      </p:par>
-    </p:tnLst>
-  </p:timing>
+</p:sld>
+</file>
+
+<file path=ppt/slides/slide6.xml><?xml version="1.0" encoding="utf-8"?>
+<p:sld xmlns:a="http://schemas.openxmlformats.org/drawingml/2006/main" xmlns:r="http://schemas.openxmlformats.org/officeDocument/2006/relationships" xmlns:p="http://schemas.openxmlformats.org/presentationml/2006/main">
+  <p:cSld>
+    <p:spTree>
+      <p:nvGrpSpPr>
+        <p:cNvPr id="1" name=""/>
+        <p:cNvGrpSpPr/>
+        <p:nvPr/>
+      </p:nvGrpSpPr>
+      <p:grpSpPr>
+        <a:xfrm>
+          <a:off x="0" y="0"/>
+          <a:ext cx="0" cy="0"/>
+          <a:chOff x="0" y="0"/>
+          <a:chExt cx="0" cy="0"/>
+        </a:xfrm>
+      </p:grpSpPr>
+      <p:sp>
+        <p:nvSpPr>
+          <p:cNvPr id="2" name="Заголовок 1"/>
+          <p:cNvSpPr>
+            <a:spLocks noGrp="1"/>
+          </p:cNvSpPr>
+          <p:nvPr>
+            <p:ph type="title"/>
+          </p:nvPr>
+        </p:nvSpPr>
+        <p:spPr/>
+        <p:txBody>
+          <a:bodyPr/>
+          <a:lstStyle/>
+          <a:p>
+            <a:pPr algn="ctr"/>
+            <a:r>
+              <a:rPr lang="ru-RU" dirty="0" smtClean="0"/>
+              <a:t>Источники данных</a:t>
+            </a:r>
+            <a:endParaRPr lang="ru-RU" dirty="0"/>
+          </a:p>
+        </p:txBody>
+      </p:sp>
+      <p:sp>
+        <p:nvSpPr>
+          <p:cNvPr id="3" name="Объект 2"/>
+          <p:cNvSpPr>
+            <a:spLocks noGrp="1"/>
+          </p:cNvSpPr>
+          <p:nvPr>
+            <p:ph idx="1"/>
+          </p:nvPr>
+        </p:nvSpPr>
+        <p:spPr/>
+        <p:txBody>
+          <a:bodyPr/>
+          <a:lstStyle/>
+          <a:p>
+            <a:pPr lvl="1">
+              <a:buFont typeface="Arial" panose="020B0604020202020204" pitchFamily="34" charset="0"/>
+              <a:buChar char="•"/>
+            </a:pPr>
+            <a:r>
+              <a:rPr lang="ru-RU" dirty="0" smtClean="0"/>
+              <a:t>Основным источником данных картографических данных является </a:t>
+            </a:r>
+            <a:r>
+              <a:rPr lang="en-US" dirty="0" smtClean="0"/>
+              <a:t>openstree</a:t>
+            </a:r>
+            <a:r>
+              <a:rPr lang="en-US" dirty="0"/>
+              <a:t>t</a:t>
+            </a:r>
+            <a:r>
+              <a:rPr lang="en-US" dirty="0" smtClean="0"/>
+              <a:t>map.org</a:t>
+            </a:r>
+            <a:endParaRPr lang="ru-RU" dirty="0" smtClean="0"/>
+          </a:p>
+          <a:p>
+            <a:pPr lvl="1">
+              <a:buFont typeface="Arial" panose="020B0604020202020204" pitchFamily="34" charset="0"/>
+              <a:buChar char="•"/>
+            </a:pPr>
+            <a:endParaRPr lang="en-US" dirty="0" smtClean="0"/>
+          </a:p>
+          <a:p>
+            <a:pPr lvl="1">
+              <a:buFont typeface="Arial" panose="020B0604020202020204" pitchFamily="34" charset="0"/>
+              <a:buChar char="•"/>
+            </a:pPr>
+            <a:r>
+              <a:rPr lang="ru-RU" dirty="0" smtClean="0"/>
+              <a:t>Источников предложений жилья является прошлогодняя база предложений </a:t>
+            </a:r>
+            <a:r>
+              <a:rPr lang="en-US" dirty="0" smtClean="0"/>
+              <a:t>cian.ru</a:t>
+            </a:r>
+            <a:endParaRPr lang="ru-RU" dirty="0" smtClean="0"/>
+          </a:p>
+          <a:p>
+            <a:pPr lvl="1">
+              <a:buFont typeface="Arial" panose="020B0604020202020204" pitchFamily="34" charset="0"/>
+              <a:buChar char="•"/>
+            </a:pPr>
+            <a:endParaRPr lang="ru-RU" dirty="0"/>
+          </a:p>
+          <a:p>
+            <a:pPr lvl="1">
+              <a:buFont typeface="Arial" panose="020B0604020202020204" pitchFamily="34" charset="0"/>
+              <a:buChar char="•"/>
+            </a:pPr>
+            <a:r>
+              <a:rPr lang="ru-RU" dirty="0" smtClean="0"/>
+              <a:t>Источниками тайлов являются </a:t>
+            </a:r>
+            <a:r>
+              <a:rPr lang="en-US" dirty="0" smtClean="0"/>
+              <a:t>mapbox.com </a:t>
+            </a:r>
+            <a:r>
+              <a:rPr lang="ru-RU" dirty="0" smtClean="0"/>
+              <a:t>и</a:t>
+            </a:r>
+            <a:r>
+              <a:rPr lang="en-US" dirty="0" smtClean="0"/>
+              <a:t> openstreetmap.org</a:t>
+            </a:r>
+            <a:endParaRPr lang="ru-RU" dirty="0"/>
+          </a:p>
+          <a:p>
+            <a:pPr lvl="1">
+              <a:buFont typeface="Arial" panose="020B0604020202020204" pitchFamily="34" charset="0"/>
+              <a:buChar char="•"/>
+            </a:pPr>
+            <a:endParaRPr lang="ru-RU" dirty="0"/>
+          </a:p>
+        </p:txBody>
+      </p:sp>
+    </p:spTree>
+    <p:extLst>
+      <p:ext uri="{BB962C8B-B14F-4D97-AF65-F5344CB8AC3E}">
+        <p14:creationId xmlns:p14="http://schemas.microsoft.com/office/powerpoint/2010/main" val="760417320"/>
+      </p:ext>
+    </p:extLst>
+  </p:cSld>
+  <p:clrMapOvr>
+    <a:masterClrMapping/>
+  </p:clrMapOvr>
+</p:sld>
+</file>
+
+<file path=ppt/slides/slide7.xml><?xml version="1.0" encoding="utf-8"?>
+<p:sld xmlns:a="http://schemas.openxmlformats.org/drawingml/2006/main" xmlns:r="http://schemas.openxmlformats.org/officeDocument/2006/relationships" xmlns:p="http://schemas.openxmlformats.org/presentationml/2006/main">
+  <p:cSld>
+    <p:spTree>
+      <p:nvGrpSpPr>
+        <p:cNvPr id="1" name=""/>
+        <p:cNvGrpSpPr/>
+        <p:nvPr/>
+      </p:nvGrpSpPr>
+      <p:grpSpPr>
+        <a:xfrm>
+          <a:off x="0" y="0"/>
+          <a:ext cx="0" cy="0"/>
+          <a:chOff x="0" y="0"/>
+          <a:chExt cx="0" cy="0"/>
+        </a:xfrm>
+      </p:grpSpPr>
+      <p:sp>
+        <p:nvSpPr>
+          <p:cNvPr id="2" name="Заголовок 1"/>
+          <p:cNvSpPr>
+            <a:spLocks noGrp="1"/>
+          </p:cNvSpPr>
+          <p:nvPr>
+            <p:ph type="title"/>
+          </p:nvPr>
+        </p:nvSpPr>
+        <p:spPr/>
+        <p:txBody>
+          <a:bodyPr/>
+          <a:lstStyle/>
+          <a:p>
+            <a:pPr algn="ctr"/>
+            <a:r>
+              <a:rPr lang="ru-RU" dirty="0" smtClean="0"/>
+              <a:t>Методы обработки</a:t>
+            </a:r>
+            <a:endParaRPr lang="ru-RU" dirty="0"/>
+          </a:p>
+        </p:txBody>
+      </p:sp>
+      <p:sp>
+        <p:nvSpPr>
+          <p:cNvPr id="3" name="Объект 2"/>
+          <p:cNvSpPr>
+            <a:spLocks noGrp="1"/>
+          </p:cNvSpPr>
+          <p:nvPr>
+            <p:ph idx="1"/>
+          </p:nvPr>
+        </p:nvSpPr>
+        <p:spPr/>
+        <p:txBody>
+          <a:bodyPr/>
+          <a:lstStyle/>
+          <a:p>
+            <a:pPr marL="201168" lvl="1" indent="0">
+              <a:buNone/>
+            </a:pPr>
+            <a:r>
+              <a:rPr lang="ru-RU" dirty="0" smtClean="0"/>
+              <a:t>Проекция меркатора – общепризнаная в мире </a:t>
+            </a:r>
+            <a:r>
+              <a:rPr lang="en-US" dirty="0" smtClean="0"/>
+              <a:t>gis</a:t>
+            </a:r>
+            <a:r>
+              <a:rPr lang="ru-RU" dirty="0"/>
+              <a:t>.</a:t>
+            </a:r>
+          </a:p>
+        </p:txBody>
+      </p:sp>
+      <p:pic>
+        <p:nvPicPr>
+          <p:cNvPr id="1026" name="Picture 2" descr="Cylindrical Projection basics2.svg"/>
+          <p:cNvPicPr>
+            <a:picLocks noChangeAspect="1" noChangeArrowheads="1"/>
+          </p:cNvPicPr>
+          <p:nvPr/>
+        </p:nvPicPr>
+        <p:blipFill>
+          <a:blip r:embed="rId2">
+            <a:extLst>
+              <a:ext uri="{28A0092B-C50C-407E-A947-70E740481C1C}">
+                <a14:useLocalDpi xmlns:a14="http://schemas.microsoft.com/office/drawing/2010/main" val="0"/>
+              </a:ext>
+            </a:extLst>
+          </a:blip>
+          <a:srcRect/>
+          <a:stretch>
+            <a:fillRect/>
+          </a:stretch>
+        </p:blipFill>
+        <p:spPr bwMode="auto">
+          <a:xfrm>
+            <a:off x="3281161" y="2639926"/>
+            <a:ext cx="4791075" cy="2200275"/>
+          </a:xfrm>
+          <a:prstGeom prst="rect">
+            <a:avLst/>
+          </a:prstGeom>
+          <a:noFill/>
+          <a:extLst>
+            <a:ext uri="{909E8E84-426E-40DD-AFC4-6F175D3DCCD1}">
+              <a14:hiddenFill xmlns:a14="http://schemas.microsoft.com/office/drawing/2010/main">
+                <a:solidFill>
+                  <a:srgbClr val="FFFFFF"/>
+                </a:solidFill>
+              </a14:hiddenFill>
+            </a:ext>
+          </a:extLst>
+        </p:spPr>
+      </p:pic>
+    </p:spTree>
+    <p:extLst>
+      <p:ext uri="{BB962C8B-B14F-4D97-AF65-F5344CB8AC3E}">
+        <p14:creationId xmlns:p14="http://schemas.microsoft.com/office/powerpoint/2010/main" val="713482464"/>
+      </p:ext>
+    </p:extLst>
+  </p:cSld>
+  <p:clrMapOvr>
+    <a:masterClrMapping/>
+  </p:clrMapOvr>
+</p:sld>
+</file>
+
+<file path=ppt/slides/slide8.xml><?xml version="1.0" encoding="utf-8"?>
+<p:sld xmlns:a="http://schemas.openxmlformats.org/drawingml/2006/main" xmlns:r="http://schemas.openxmlformats.org/officeDocument/2006/relationships" xmlns:p="http://schemas.openxmlformats.org/presentationml/2006/main">
+  <p:cSld>
+    <p:spTree>
+      <p:nvGrpSpPr>
+        <p:cNvPr id="1" name=""/>
+        <p:cNvGrpSpPr/>
+        <p:nvPr/>
+      </p:nvGrpSpPr>
+      <p:grpSpPr>
+        <a:xfrm>
+          <a:off x="0" y="0"/>
+          <a:ext cx="0" cy="0"/>
+          <a:chOff x="0" y="0"/>
+          <a:chExt cx="0" cy="0"/>
+        </a:xfrm>
+      </p:grpSpPr>
+      <p:sp>
+        <p:nvSpPr>
+          <p:cNvPr id="2" name="Заголовок 1"/>
+          <p:cNvSpPr>
+            <a:spLocks noGrp="1"/>
+          </p:cNvSpPr>
+          <p:nvPr>
+            <p:ph type="title"/>
+          </p:nvPr>
+        </p:nvSpPr>
+        <p:spPr/>
+        <p:txBody>
+          <a:bodyPr/>
+          <a:lstStyle/>
+          <a:p>
+            <a:pPr algn="ctr"/>
+            <a:r>
+              <a:rPr lang="ru-RU" dirty="0"/>
+              <a:t>Методы обработки</a:t>
+            </a:r>
+          </a:p>
+        </p:txBody>
+      </p:sp>
+      <p:sp>
+        <p:nvSpPr>
+          <p:cNvPr id="3" name="Объект 2"/>
+          <p:cNvSpPr>
+            <a:spLocks noGrp="1"/>
+          </p:cNvSpPr>
+          <p:nvPr>
+            <p:ph idx="1"/>
+          </p:nvPr>
+        </p:nvSpPr>
+        <p:spPr/>
+        <p:txBody>
+          <a:bodyPr/>
+          <a:lstStyle/>
+          <a:p>
+            <a:r>
+              <a:rPr lang="ru-RU" dirty="0" smtClean="0"/>
+              <a:t>Квадродерево – простой в реализации и хороший по производительности метод организации на плоскости.</a:t>
+            </a:r>
+            <a:endParaRPr lang="ru-RU" dirty="0"/>
+          </a:p>
+        </p:txBody>
+      </p:sp>
+      <p:pic>
+        <p:nvPicPr>
+          <p:cNvPr id="2050" name="Picture 2" descr="https://upload.wikimedia.org/wikipedia/commons/thumb/8/8b/Point_quadtree.svg/500px-Point_quadtree.svg.png"/>
+          <p:cNvPicPr>
+            <a:picLocks noChangeAspect="1" noChangeArrowheads="1"/>
+          </p:cNvPicPr>
+          <p:nvPr/>
+        </p:nvPicPr>
+        <p:blipFill>
+          <a:blip r:embed="rId2">
+            <a:extLst>
+              <a:ext uri="{28A0092B-C50C-407E-A947-70E740481C1C}">
+                <a14:useLocalDpi xmlns:a14="http://schemas.microsoft.com/office/drawing/2010/main" val="0"/>
+              </a:ext>
+            </a:extLst>
+          </a:blip>
+          <a:srcRect/>
+          <a:stretch>
+            <a:fillRect/>
+          </a:stretch>
+        </p:blipFill>
+        <p:spPr bwMode="auto">
+          <a:xfrm>
+            <a:off x="4469659" y="2555452"/>
+            <a:ext cx="3313642" cy="3313642"/>
+          </a:xfrm>
+          <a:prstGeom prst="rect">
+            <a:avLst/>
+          </a:prstGeom>
+          <a:noFill/>
+          <a:extLst>
+            <a:ext uri="{909E8E84-426E-40DD-AFC4-6F175D3DCCD1}">
+              <a14:hiddenFill xmlns:a14="http://schemas.microsoft.com/office/drawing/2010/main">
+                <a:solidFill>
+                  <a:srgbClr val="FFFFFF"/>
+                </a:solidFill>
+              </a14:hiddenFill>
+            </a:ext>
+          </a:extLst>
+        </p:spPr>
+      </p:pic>
+    </p:spTree>
+    <p:extLst>
+      <p:ext uri="{BB962C8B-B14F-4D97-AF65-F5344CB8AC3E}">
+        <p14:creationId xmlns:p14="http://schemas.microsoft.com/office/powerpoint/2010/main" val="3130510407"/>
+      </p:ext>
+    </p:extLst>
+  </p:cSld>
+  <p:clrMapOvr>
+    <a:masterClrMapping/>
+  </p:clrMapOvr>
+</p:sld>
+</file>
+
+<file path=ppt/slides/slide9.xml><?xml version="1.0" encoding="utf-8"?>
+<p:sld xmlns:a="http://schemas.openxmlformats.org/drawingml/2006/main" xmlns:r="http://schemas.openxmlformats.org/officeDocument/2006/relationships" xmlns:p="http://schemas.openxmlformats.org/presentationml/2006/main">
+  <p:cSld>
+    <p:spTree>
+      <p:nvGrpSpPr>
+        <p:cNvPr id="1" name=""/>
+        <p:cNvGrpSpPr/>
+        <p:nvPr/>
+      </p:nvGrpSpPr>
+      <p:grpSpPr>
+        <a:xfrm>
+          <a:off x="0" y="0"/>
+          <a:ext cx="0" cy="0"/>
+          <a:chOff x="0" y="0"/>
+          <a:chExt cx="0" cy="0"/>
+        </a:xfrm>
+      </p:grpSpPr>
+      <p:sp>
+        <p:nvSpPr>
+          <p:cNvPr id="2" name="Заголовок 1"/>
+          <p:cNvSpPr>
+            <a:spLocks noGrp="1"/>
+          </p:cNvSpPr>
+          <p:nvPr>
+            <p:ph type="title"/>
+          </p:nvPr>
+        </p:nvSpPr>
+        <p:spPr/>
+        <p:txBody>
+          <a:bodyPr/>
+          <a:lstStyle/>
+          <a:p>
+            <a:pPr algn="ctr"/>
+            <a:r>
+              <a:rPr lang="ru-RU" dirty="0" smtClean="0"/>
+              <a:t>Используемые интрументы</a:t>
+            </a:r>
+            <a:endParaRPr lang="ru-RU" dirty="0"/>
+          </a:p>
+        </p:txBody>
+      </p:sp>
+      <p:sp>
+        <p:nvSpPr>
+          <p:cNvPr id="3" name="Объект 2"/>
+          <p:cNvSpPr>
+            <a:spLocks noGrp="1"/>
+          </p:cNvSpPr>
+          <p:nvPr>
+            <p:ph idx="1"/>
+          </p:nvPr>
+        </p:nvSpPr>
+        <p:spPr/>
+        <p:txBody>
+          <a:bodyPr/>
+          <a:lstStyle/>
+          <a:p>
+            <a:pPr lvl="1">
+              <a:buFont typeface="Arial" panose="020B0604020202020204" pitchFamily="34" charset="0"/>
+              <a:buChar char="•"/>
+            </a:pPr>
+            <a:r>
+              <a:rPr lang="ru-RU" dirty="0" smtClean="0"/>
+              <a:t>Как язык для написания сервера была выбрана </a:t>
+            </a:r>
+            <a:r>
+              <a:rPr lang="en-US" dirty="0"/>
+              <a:t>J</a:t>
+            </a:r>
+            <a:r>
+              <a:rPr lang="en-US" dirty="0" smtClean="0"/>
+              <a:t>ava</a:t>
+            </a:r>
+          </a:p>
+          <a:p>
+            <a:pPr lvl="2">
+              <a:buFont typeface="Arial" panose="020B0604020202020204" pitchFamily="34" charset="0"/>
+              <a:buChar char="•"/>
+            </a:pPr>
+            <a:r>
+              <a:rPr lang="ru-RU" dirty="0" smtClean="0"/>
+              <a:t>Для написания сервера был использован </a:t>
+            </a:r>
+            <a:r>
+              <a:rPr lang="en-US" dirty="0" smtClean="0"/>
+              <a:t>Netty</a:t>
+            </a:r>
+            <a:endParaRPr lang="ru-RU" dirty="0" smtClean="0"/>
+          </a:p>
+          <a:p>
+            <a:pPr lvl="2">
+              <a:buFont typeface="Arial" panose="020B0604020202020204" pitchFamily="34" charset="0"/>
+              <a:buChar char="•"/>
+            </a:pPr>
+            <a:r>
+              <a:rPr lang="ru-RU" dirty="0" smtClean="0"/>
+              <a:t>Для парсинга </a:t>
+            </a:r>
+            <a:r>
+              <a:rPr lang="en-US" dirty="0" smtClean="0"/>
+              <a:t>json </a:t>
+            </a:r>
+            <a:r>
+              <a:rPr lang="ru-RU" dirty="0" smtClean="0"/>
+              <a:t>был использован </a:t>
+            </a:r>
+            <a:r>
+              <a:rPr lang="en-US" dirty="0" smtClean="0"/>
+              <a:t>minimal-json</a:t>
+            </a:r>
+            <a:endParaRPr lang="ru-RU" dirty="0"/>
+          </a:p>
+          <a:p>
+            <a:pPr marL="384048" lvl="2" indent="0">
+              <a:buNone/>
+            </a:pPr>
+            <a:endParaRPr lang="ru-RU" dirty="0" smtClean="0"/>
+          </a:p>
+          <a:p>
+            <a:pPr lvl="1">
+              <a:buFont typeface="Arial" panose="020B0604020202020204" pitchFamily="34" charset="0"/>
+              <a:buChar char="•"/>
+            </a:pPr>
+            <a:r>
+              <a:rPr lang="ru-RU" dirty="0" smtClean="0"/>
+              <a:t>Как язык для написания клиента был выбран </a:t>
+            </a:r>
+            <a:r>
+              <a:rPr lang="en-US" dirty="0" smtClean="0"/>
+              <a:t>Python</a:t>
+            </a:r>
+          </a:p>
+          <a:p>
+            <a:pPr lvl="2">
+              <a:buFont typeface="Arial" panose="020B0604020202020204" pitchFamily="34" charset="0"/>
+              <a:buChar char="•"/>
+            </a:pPr>
+            <a:r>
+              <a:rPr lang="ru-RU" dirty="0" smtClean="0"/>
+              <a:t>Для написания </a:t>
+            </a:r>
+            <a:r>
+              <a:rPr lang="en-US" dirty="0" smtClean="0"/>
+              <a:t>GUI</a:t>
+            </a:r>
+            <a:r>
+              <a:rPr lang="ru-RU" dirty="0" smtClean="0"/>
+              <a:t> был использова </a:t>
+            </a:r>
+            <a:r>
+              <a:rPr lang="en-US" dirty="0" smtClean="0"/>
+              <a:t>wxPython</a:t>
+            </a:r>
+            <a:endParaRPr lang="ru-RU" dirty="0" smtClean="0"/>
+          </a:p>
+          <a:p>
+            <a:pPr marL="384048" lvl="2" indent="0">
+              <a:buNone/>
+            </a:pPr>
+            <a:endParaRPr lang="ru-RU" dirty="0" smtClean="0"/>
+          </a:p>
+          <a:p>
+            <a:pPr lvl="1">
+              <a:buFont typeface="Arial" panose="020B0604020202020204" pitchFamily="34" charset="0"/>
+              <a:buChar char="•"/>
+            </a:pPr>
+            <a:r>
+              <a:rPr lang="ru-RU" dirty="0" smtClean="0"/>
+              <a:t>Для раздачи статического контента был выбрал </a:t>
+            </a:r>
+            <a:r>
+              <a:rPr lang="en-US" dirty="0" smtClean="0"/>
+              <a:t>Nginx</a:t>
+            </a:r>
+          </a:p>
+          <a:p>
+            <a:pPr lvl="1">
+              <a:buFont typeface="Arial" panose="020B0604020202020204" pitchFamily="34" charset="0"/>
+              <a:buChar char="•"/>
+            </a:pPr>
+            <a:endParaRPr lang="ru-RU" dirty="0" smtClean="0"/>
+          </a:p>
+          <a:p>
+            <a:pPr lvl="1">
+              <a:buFont typeface="Arial" panose="020B0604020202020204" pitchFamily="34" charset="0"/>
+              <a:buChar char="•"/>
+            </a:pPr>
+            <a:endParaRPr lang="en-US" dirty="0"/>
+          </a:p>
+          <a:p>
+            <a:pPr lvl="1">
+              <a:buFont typeface="Arial" panose="020B0604020202020204" pitchFamily="34" charset="0"/>
+              <a:buChar char="•"/>
+            </a:pPr>
+            <a:r>
+              <a:rPr lang="en-US" dirty="0" smtClean="0"/>
+              <a:t>api</a:t>
+            </a:r>
+            <a:r>
+              <a:rPr lang="ru-RU" dirty="0" smtClean="0"/>
+              <a:t> я решил строить по принципам </a:t>
+            </a:r>
+            <a:r>
+              <a:rPr lang="en-US" dirty="0" smtClean="0"/>
+              <a:t>RESTful</a:t>
+            </a:r>
+            <a:r>
+              <a:rPr lang="ru-RU" dirty="0" smtClean="0"/>
+              <a:t> архитектуры, отдавая данные в формате </a:t>
+            </a:r>
+            <a:r>
+              <a:rPr lang="en-US" dirty="0" smtClean="0"/>
+              <a:t>json</a:t>
+            </a:r>
+            <a:endParaRPr lang="ru-RU" dirty="0"/>
+          </a:p>
+        </p:txBody>
+      </p:sp>
+    </p:spTree>
+    <p:extLst>
+      <p:ext uri="{BB962C8B-B14F-4D97-AF65-F5344CB8AC3E}">
+        <p14:creationId xmlns:p14="http://schemas.microsoft.com/office/powerpoint/2010/main" val="3802839692"/>
+      </p:ext>
+    </p:extLst>
+  </p:cSld>
+  <p:clrMapOvr>
+    <a:masterClrMapping/>
+  </p:clrMapOvr>
 </p:sld>
 </file>
 

</xml_diff>